<commit_message>
Change module name for MAP
</commit_message>
<xml_diff>
--- a/arm-map/arm_map.pptx
+++ b/arm-map/arm_map.pptx
@@ -218,7 +218,7 @@
           <a:p>
             <a:fld id="{DCBCB4EF-AF11-42C5-A407-C6B5B92B4E13}" type="datetimeFigureOut">
               <a:rPr lang="nl-BE" smtClean="0"/>
-              <a:t>27/01/2022</a:t>
+              <a:t>22/03/2024</a:t>
             </a:fld>
             <a:endParaRPr lang="nl-BE"/>
           </a:p>
@@ -701,7 +701,7 @@
           <a:p>
             <a:fld id="{16EF12B4-B810-4A0E-8BE8-50A63E57FF46}" type="datetime1">
               <a:rPr lang="nl-BE" smtClean="0"/>
-              <a:t>27/01/2022</a:t>
+              <a:t>22/03/2024</a:t>
             </a:fld>
             <a:endParaRPr lang="nl-BE"/>
           </a:p>
@@ -871,7 +871,7 @@
           <a:p>
             <a:fld id="{1C4C54F0-81EA-4EDD-8D8A-D45FC20BB49D}" type="datetime1">
               <a:rPr lang="nl-BE" smtClean="0"/>
-              <a:t>27/01/2022</a:t>
+              <a:t>22/03/2024</a:t>
             </a:fld>
             <a:endParaRPr lang="nl-BE"/>
           </a:p>
@@ -1051,7 +1051,7 @@
           <a:p>
             <a:fld id="{C777687B-F7A2-4048-B084-F43AE07119BE}" type="datetime1">
               <a:rPr lang="nl-BE" smtClean="0"/>
-              <a:t>27/01/2022</a:t>
+              <a:t>22/03/2024</a:t>
             </a:fld>
             <a:endParaRPr lang="nl-BE"/>
           </a:p>
@@ -1221,7 +1221,7 @@
           <a:p>
             <a:fld id="{17D68A66-8CE0-4AE5-B09A-AFB1DA1D35B7}" type="datetime1">
               <a:rPr lang="nl-BE" smtClean="0"/>
-              <a:t>27/01/2022</a:t>
+              <a:t>22/03/2024</a:t>
             </a:fld>
             <a:endParaRPr lang="nl-BE"/>
           </a:p>
@@ -1465,7 +1465,7 @@
           <a:p>
             <a:fld id="{ACD2EF45-07D9-47DD-8D2C-044FB9A2A8C8}" type="datetime1">
               <a:rPr lang="nl-BE" smtClean="0"/>
-              <a:t>27/01/2022</a:t>
+              <a:t>22/03/2024</a:t>
             </a:fld>
             <a:endParaRPr lang="nl-BE"/>
           </a:p>
@@ -1697,7 +1697,7 @@
           <a:p>
             <a:fld id="{C1AA2C35-BB49-44DC-82C3-3BD7F8F0132B}" type="datetime1">
               <a:rPr lang="nl-BE" smtClean="0"/>
-              <a:t>27/01/2022</a:t>
+              <a:t>22/03/2024</a:t>
             </a:fld>
             <a:endParaRPr lang="nl-BE"/>
           </a:p>
@@ -2064,7 +2064,7 @@
           <a:p>
             <a:fld id="{EF292103-E950-40E9-A111-1A108610AB2D}" type="datetime1">
               <a:rPr lang="nl-BE" smtClean="0"/>
-              <a:t>27/01/2022</a:t>
+              <a:t>22/03/2024</a:t>
             </a:fld>
             <a:endParaRPr lang="nl-BE"/>
           </a:p>
@@ -2182,7 +2182,7 @@
           <a:p>
             <a:fld id="{C309520F-DE14-43BC-AF22-FA4B0586587C}" type="datetime1">
               <a:rPr lang="nl-BE" smtClean="0"/>
-              <a:t>27/01/2022</a:t>
+              <a:t>22/03/2024</a:t>
             </a:fld>
             <a:endParaRPr lang="nl-BE"/>
           </a:p>
@@ -2277,7 +2277,7 @@
           <a:p>
             <a:fld id="{89A75246-50AD-43D4-AC8F-C9CEFC06F414}" type="datetime1">
               <a:rPr lang="nl-BE" smtClean="0"/>
-              <a:t>27/01/2022</a:t>
+              <a:t>22/03/2024</a:t>
             </a:fld>
             <a:endParaRPr lang="nl-BE"/>
           </a:p>
@@ -2554,7 +2554,7 @@
           <a:p>
             <a:fld id="{8D0AC96A-CB4C-447A-BAE9-CD71E5D3E387}" type="datetime1">
               <a:rPr lang="nl-BE" smtClean="0"/>
-              <a:t>27/01/2022</a:t>
+              <a:t>22/03/2024</a:t>
             </a:fld>
             <a:endParaRPr lang="nl-BE"/>
           </a:p>
@@ -2811,7 +2811,7 @@
           <a:p>
             <a:fld id="{8EF713C0-6057-4AAB-80ED-C8B012F691C2}" type="datetime1">
               <a:rPr lang="nl-BE" smtClean="0"/>
-              <a:t>27/01/2022</a:t>
+              <a:t>22/03/2024</a:t>
             </a:fld>
             <a:endParaRPr lang="nl-BE"/>
           </a:p>
@@ -3024,7 +3024,7 @@
           <a:p>
             <a:fld id="{67CEDA06-6E27-4D36-9084-23ECECD0BA0D}" type="datetime1">
               <a:rPr lang="nl-BE" smtClean="0"/>
-              <a:t>27/01/2022</a:t>
+              <a:t>22/03/2024</a:t>
             </a:fld>
             <a:endParaRPr lang="nl-BE"/>
           </a:p>
@@ -14270,7 +14270,7 @@
         <p:spPr>
           <a:xfrm>
             <a:off x="750498" y="1708034"/>
-            <a:ext cx="2847254" cy="646331"/>
+            <a:ext cx="2595582" cy="646331"/>
           </a:xfrm>
           <a:prstGeom prst="rect">
             <a:avLst/>
@@ -14299,7 +14299,7 @@
                   <a:schemeClr val="bg1"/>
                 </a:solidFill>
               </a:rPr>
-              <a:t>AllineaForge</a:t>
+              <a:t>ArmForge</a:t>
             </a:r>
             <a:endParaRPr lang="en-US" b="1" dirty="0">
               <a:solidFill>

</xml_diff>

<commit_message>
Replace Arm by Linaro
Since MAP & DDT were taken over by Lnaro from Arm, slides are updated accordingly.
</commit_message>
<xml_diff>
--- a/arm-map/arm_map.pptx
+++ b/arm-map/arm_map.pptx
@@ -218,7 +218,7 @@
           <a:p>
             <a:fld id="{DCBCB4EF-AF11-42C5-A407-C6B5B92B4E13}" type="datetimeFigureOut">
               <a:rPr lang="nl-BE" smtClean="0"/>
-              <a:t>22/03/2024</a:t>
+              <a:t>15/01/2025</a:t>
             </a:fld>
             <a:endParaRPr lang="nl-BE"/>
           </a:p>
@@ -701,7 +701,7 @@
           <a:p>
             <a:fld id="{16EF12B4-B810-4A0E-8BE8-50A63E57FF46}" type="datetime1">
               <a:rPr lang="nl-BE" smtClean="0"/>
-              <a:t>22/03/2024</a:t>
+              <a:t>15/01/2025</a:t>
             </a:fld>
             <a:endParaRPr lang="nl-BE"/>
           </a:p>
@@ -871,7 +871,7 @@
           <a:p>
             <a:fld id="{1C4C54F0-81EA-4EDD-8D8A-D45FC20BB49D}" type="datetime1">
               <a:rPr lang="nl-BE" smtClean="0"/>
-              <a:t>22/03/2024</a:t>
+              <a:t>15/01/2025</a:t>
             </a:fld>
             <a:endParaRPr lang="nl-BE"/>
           </a:p>
@@ -1051,7 +1051,7 @@
           <a:p>
             <a:fld id="{C777687B-F7A2-4048-B084-F43AE07119BE}" type="datetime1">
               <a:rPr lang="nl-BE" smtClean="0"/>
-              <a:t>22/03/2024</a:t>
+              <a:t>15/01/2025</a:t>
             </a:fld>
             <a:endParaRPr lang="nl-BE"/>
           </a:p>
@@ -1221,7 +1221,7 @@
           <a:p>
             <a:fld id="{17D68A66-8CE0-4AE5-B09A-AFB1DA1D35B7}" type="datetime1">
               <a:rPr lang="nl-BE" smtClean="0"/>
-              <a:t>22/03/2024</a:t>
+              <a:t>15/01/2025</a:t>
             </a:fld>
             <a:endParaRPr lang="nl-BE"/>
           </a:p>
@@ -1465,7 +1465,7 @@
           <a:p>
             <a:fld id="{ACD2EF45-07D9-47DD-8D2C-044FB9A2A8C8}" type="datetime1">
               <a:rPr lang="nl-BE" smtClean="0"/>
-              <a:t>22/03/2024</a:t>
+              <a:t>15/01/2025</a:t>
             </a:fld>
             <a:endParaRPr lang="nl-BE"/>
           </a:p>
@@ -1697,7 +1697,7 @@
           <a:p>
             <a:fld id="{C1AA2C35-BB49-44DC-82C3-3BD7F8F0132B}" type="datetime1">
               <a:rPr lang="nl-BE" smtClean="0"/>
-              <a:t>22/03/2024</a:t>
+              <a:t>15/01/2025</a:t>
             </a:fld>
             <a:endParaRPr lang="nl-BE"/>
           </a:p>
@@ -2064,7 +2064,7 @@
           <a:p>
             <a:fld id="{EF292103-E950-40E9-A111-1A108610AB2D}" type="datetime1">
               <a:rPr lang="nl-BE" smtClean="0"/>
-              <a:t>22/03/2024</a:t>
+              <a:t>15/01/2025</a:t>
             </a:fld>
             <a:endParaRPr lang="nl-BE"/>
           </a:p>
@@ -2182,7 +2182,7 @@
           <a:p>
             <a:fld id="{C309520F-DE14-43BC-AF22-FA4B0586587C}" type="datetime1">
               <a:rPr lang="nl-BE" smtClean="0"/>
-              <a:t>22/03/2024</a:t>
+              <a:t>15/01/2025</a:t>
             </a:fld>
             <a:endParaRPr lang="nl-BE"/>
           </a:p>
@@ -2277,7 +2277,7 @@
           <a:p>
             <a:fld id="{89A75246-50AD-43D4-AC8F-C9CEFC06F414}" type="datetime1">
               <a:rPr lang="nl-BE" smtClean="0"/>
-              <a:t>22/03/2024</a:t>
+              <a:t>15/01/2025</a:t>
             </a:fld>
             <a:endParaRPr lang="nl-BE"/>
           </a:p>
@@ -2554,7 +2554,7 @@
           <a:p>
             <a:fld id="{8D0AC96A-CB4C-447A-BAE9-CD71E5D3E387}" type="datetime1">
               <a:rPr lang="nl-BE" smtClean="0"/>
-              <a:t>22/03/2024</a:t>
+              <a:t>15/01/2025</a:t>
             </a:fld>
             <a:endParaRPr lang="nl-BE"/>
           </a:p>
@@ -2811,7 +2811,7 @@
           <a:p>
             <a:fld id="{8EF713C0-6057-4AAB-80ED-C8B012F691C2}" type="datetime1">
               <a:rPr lang="nl-BE" smtClean="0"/>
-              <a:t>22/03/2024</a:t>
+              <a:t>15/01/2025</a:t>
             </a:fld>
             <a:endParaRPr lang="nl-BE"/>
           </a:p>
@@ -3024,7 +3024,7 @@
           <a:p>
             <a:fld id="{67CEDA06-6E27-4D36-9084-23ECECD0BA0D}" type="datetime1">
               <a:rPr lang="nl-BE" smtClean="0"/>
-              <a:t>22/03/2024</a:t>
+              <a:t>15/01/2025</a:t>
             </a:fld>
             <a:endParaRPr lang="nl-BE"/>
           </a:p>
@@ -3453,8 +3453,12 @@
               <a:rPr lang="en-US" dirty="0"/>
             </a:br>
             <a:r>
+              <a:rPr lang="en-US" dirty="0" err="1"/>
+              <a:t>Linaro</a:t>
+            </a:r>
+            <a:r>
               <a:rPr lang="en-US" dirty="0"/>
-              <a:t>Arm MAP</a:t>
+              <a:t> MAP</a:t>
             </a:r>
             <a:endParaRPr lang="nl-BE" dirty="0"/>
           </a:p>
@@ -11702,21 +11706,25 @@
           <a:lstStyle/>
           <a:p>
             <a:r>
+              <a:rPr lang="en-US" dirty="0" err="1"/>
+              <a:t>Linaro</a:t>
+            </a:r>
+            <a:r>
               <a:rPr lang="en-US" dirty="0"/>
-              <a:t>Arm Forge </a:t>
-            </a:r>
-            <a:r>
-              <a:rPr lang="en-US" sz="1100" dirty="0"/>
+              <a:t> Forge </a:t>
+            </a:r>
+            <a:r>
+              <a:rPr lang="en-US" sz="2400" dirty="0"/>
               <a:t>(</a:t>
             </a:r>
             <a:r>
-              <a:rPr lang="en-GB" sz="1100" dirty="0">
+              <a:rPr lang="en-US" sz="2400" dirty="0">
                 <a:hlinkClick r:id="rId2"/>
               </a:rPr>
-              <a:t>https://developer.arm.com/tools-and-software/server-and-hpc/debug-and-profile/arm-forge</a:t>
-            </a:r>
-            <a:r>
-              <a:rPr lang="en-GB" sz="1100" dirty="0"/>
+              <a:t>https://www.linaroforge.com/</a:t>
+            </a:r>
+            <a:r>
+              <a:rPr lang="en-GB" sz="2400" dirty="0"/>
               <a:t>)</a:t>
             </a:r>
           </a:p>
@@ -11853,7 +11861,7 @@
           <a:p>
             <a:pPr lvl="2"/>
             <a:r>
-              <a:rPr lang="en-US"/>
+              <a:rPr lang="en-US" dirty="0"/>
               <a:t>…</a:t>
             </a:r>
             <a:endParaRPr lang="nl-BE" dirty="0"/>
@@ -14270,7 +14278,7 @@
         <p:spPr>
           <a:xfrm>
             <a:off x="750498" y="1708034"/>
-            <a:ext cx="2595582" cy="646331"/>
+            <a:ext cx="2780313" cy="646331"/>
           </a:xfrm>
           <a:prstGeom prst="rect">
             <a:avLst/>
@@ -14299,7 +14307,7 @@
                   <a:schemeClr val="bg1"/>
                 </a:solidFill>
               </a:rPr>
-              <a:t>ArmForge</a:t>
+              <a:t>LinaroForge</a:t>
             </a:r>
             <a:endParaRPr lang="en-US" b="1" dirty="0">
               <a:solidFill>

</xml_diff>